<commit_message>
docs(whitepaper):rewrite descriptions for basic flow with architecture diagram with new name
Signed-off-by: Shingo Fujimoto <shingo_fujimoto@fujitsu.com>
</commit_message>
<xml_diff>
--- a/whitepaper/architecture-with-plugin-and-routing.pptx
+++ b/whitepaper/architecture-with-plugin-and-routing.pptx
@@ -260,7 +260,7 @@
           <a:p>
             <a:fld id="{7DE07BE9-23A8-4C70-A439-22F4191CA9DF}" type="datetimeFigureOut">
               <a:rPr kumimoji="1" lang="ja-JP" altLang="en-US" smtClean="0"/>
-              <a:t>2020/5/23</a:t>
+              <a:t>2020/5/25</a:t>
             </a:fld>
             <a:endParaRPr kumimoji="1" lang="ja-JP" altLang="en-US"/>
           </a:p>
@@ -490,7 +490,7 @@
           <a:p>
             <a:fld id="{7DE07BE9-23A8-4C70-A439-22F4191CA9DF}" type="datetimeFigureOut">
               <a:rPr kumimoji="1" lang="ja-JP" altLang="en-US" smtClean="0"/>
-              <a:t>2020/5/23</a:t>
+              <a:t>2020/5/25</a:t>
             </a:fld>
             <a:endParaRPr kumimoji="1" lang="ja-JP" altLang="en-US"/>
           </a:p>
@@ -730,7 +730,7 @@
           <a:p>
             <a:fld id="{7DE07BE9-23A8-4C70-A439-22F4191CA9DF}" type="datetimeFigureOut">
               <a:rPr kumimoji="1" lang="ja-JP" altLang="en-US" smtClean="0"/>
-              <a:t>2020/5/23</a:t>
+              <a:t>2020/5/25</a:t>
             </a:fld>
             <a:endParaRPr kumimoji="1" lang="ja-JP" altLang="en-US"/>
           </a:p>
@@ -960,7 +960,7 @@
           <a:p>
             <a:fld id="{7DE07BE9-23A8-4C70-A439-22F4191CA9DF}" type="datetimeFigureOut">
               <a:rPr kumimoji="1" lang="ja-JP" altLang="en-US" smtClean="0"/>
-              <a:t>2020/5/23</a:t>
+              <a:t>2020/5/25</a:t>
             </a:fld>
             <a:endParaRPr kumimoji="1" lang="ja-JP" altLang="en-US"/>
           </a:p>
@@ -1235,7 +1235,7 @@
           <a:p>
             <a:fld id="{7DE07BE9-23A8-4C70-A439-22F4191CA9DF}" type="datetimeFigureOut">
               <a:rPr kumimoji="1" lang="ja-JP" altLang="en-US" smtClean="0"/>
-              <a:t>2020/5/23</a:t>
+              <a:t>2020/5/25</a:t>
             </a:fld>
             <a:endParaRPr kumimoji="1" lang="ja-JP" altLang="en-US"/>
           </a:p>
@@ -1564,7 +1564,7 @@
           <a:p>
             <a:fld id="{7DE07BE9-23A8-4C70-A439-22F4191CA9DF}" type="datetimeFigureOut">
               <a:rPr kumimoji="1" lang="ja-JP" altLang="en-US" smtClean="0"/>
-              <a:t>2020/5/23</a:t>
+              <a:t>2020/5/25</a:t>
             </a:fld>
             <a:endParaRPr kumimoji="1" lang="ja-JP" altLang="en-US"/>
           </a:p>
@@ -2040,7 +2040,7 @@
           <a:p>
             <a:fld id="{7DE07BE9-23A8-4C70-A439-22F4191CA9DF}" type="datetimeFigureOut">
               <a:rPr kumimoji="1" lang="ja-JP" altLang="en-US" smtClean="0"/>
-              <a:t>2020/5/23</a:t>
+              <a:t>2020/5/25</a:t>
             </a:fld>
             <a:endParaRPr kumimoji="1" lang="ja-JP" altLang="en-US"/>
           </a:p>
@@ -2181,7 +2181,7 @@
           <a:p>
             <a:fld id="{7DE07BE9-23A8-4C70-A439-22F4191CA9DF}" type="datetimeFigureOut">
               <a:rPr kumimoji="1" lang="ja-JP" altLang="en-US" smtClean="0"/>
-              <a:t>2020/5/23</a:t>
+              <a:t>2020/5/25</a:t>
             </a:fld>
             <a:endParaRPr kumimoji="1" lang="ja-JP" altLang="en-US"/>
           </a:p>
@@ -2294,7 +2294,7 @@
           <a:p>
             <a:fld id="{7DE07BE9-23A8-4C70-A439-22F4191CA9DF}" type="datetimeFigureOut">
               <a:rPr kumimoji="1" lang="ja-JP" altLang="en-US" smtClean="0"/>
-              <a:t>2020/5/23</a:t>
+              <a:t>2020/5/25</a:t>
             </a:fld>
             <a:endParaRPr kumimoji="1" lang="ja-JP" altLang="en-US"/>
           </a:p>
@@ -2637,7 +2637,7 @@
           <a:p>
             <a:fld id="{7DE07BE9-23A8-4C70-A439-22F4191CA9DF}" type="datetimeFigureOut">
               <a:rPr kumimoji="1" lang="ja-JP" altLang="en-US" smtClean="0"/>
-              <a:t>2020/5/23</a:t>
+              <a:t>2020/5/25</a:t>
             </a:fld>
             <a:endParaRPr kumimoji="1" lang="ja-JP" altLang="en-US"/>
           </a:p>
@@ -2925,7 +2925,7 @@
           <a:p>
             <a:fld id="{7DE07BE9-23A8-4C70-A439-22F4191CA9DF}" type="datetimeFigureOut">
               <a:rPr kumimoji="1" lang="ja-JP" altLang="en-US" smtClean="0"/>
-              <a:t>2020/5/23</a:t>
+              <a:t>2020/5/25</a:t>
             </a:fld>
             <a:endParaRPr kumimoji="1" lang="ja-JP" altLang="en-US"/>
           </a:p>
@@ -3198,7 +3198,7 @@
           <a:p>
             <a:fld id="{7DE07BE9-23A8-4C70-A439-22F4191CA9DF}" type="datetimeFigureOut">
               <a:rPr kumimoji="1" lang="ja-JP" altLang="en-US" smtClean="0"/>
-              <a:t>2020/5/23</a:t>
+              <a:t>2020/5/25</a:t>
             </a:fld>
             <a:endParaRPr kumimoji="1" lang="ja-JP" altLang="en-US"/>
           </a:p>
@@ -3718,10 +3718,10 @@
                   <a:latin typeface="メイリオ" panose="020B0604030504040204" pitchFamily="50" charset="-128"/>
                   <a:ea typeface="メイリオ" panose="020B0604030504040204" pitchFamily="50" charset="-128"/>
                 </a:rPr>
-                <a:t>(BIF) Routing </a:t>
+                <a:t>Cactus Routing </a:t>
               </a:r>
               <a:r>
-                <a:rPr lang="en-US" altLang="ja-JP" sz="1400" b="1">
+                <a:rPr lang="en-US" altLang="ja-JP" sz="1400" b="1" dirty="0">
                   <a:solidFill>
                     <a:srgbClr val="000000"/>
                   </a:solidFill>
@@ -3731,7 +3731,7 @@
                 <a:t>I</a:t>
               </a:r>
               <a:r>
-                <a:rPr kumimoji="1" lang="en-US" altLang="ja-JP" sz="1400" b="1" i="0" u="none" strike="noStrike" cap="none" normalizeH="0" baseline="0">
+                <a:rPr kumimoji="1" lang="en-US" altLang="ja-JP" sz="1400" b="1" i="0" u="none" strike="noStrike" cap="none" normalizeH="0" baseline="0" dirty="0">
                   <a:ln>
                     <a:noFill/>
                   </a:ln>

</xml_diff>